<commit_message>
Update Font of code blocks.
</commit_message>
<xml_diff>
--- a/presentations/Svelte&OpenAI.pptx
+++ b/presentations/Svelte&OpenAI.pptx
@@ -4,17 +4,23 @@
   <p:sldMasterIdLst>
     <p:sldMasterId id="2147483660" r:id="rId1"/>
   </p:sldMasterIdLst>
+  <p:notesMasterIdLst>
+    <p:notesMasterId r:id="rId15"/>
+  </p:notesMasterIdLst>
   <p:sldIdLst>
     <p:sldId id="256" r:id="rId2"/>
     <p:sldId id="258" r:id="rId3"/>
-    <p:sldId id="260" r:id="rId4"/>
-    <p:sldId id="261" r:id="rId5"/>
-    <p:sldId id="262" r:id="rId6"/>
-    <p:sldId id="263" r:id="rId7"/>
-    <p:sldId id="265" r:id="rId8"/>
-    <p:sldId id="266" r:id="rId9"/>
-    <p:sldId id="268" r:id="rId10"/>
-    <p:sldId id="269" r:id="rId11"/>
+    <p:sldId id="275" r:id="rId4"/>
+    <p:sldId id="276" r:id="rId5"/>
+    <p:sldId id="277" r:id="rId6"/>
+    <p:sldId id="260" r:id="rId7"/>
+    <p:sldId id="270" r:id="rId8"/>
+    <p:sldId id="271" r:id="rId9"/>
+    <p:sldId id="272" r:id="rId10"/>
+    <p:sldId id="265" r:id="rId11"/>
+    <p:sldId id="266" r:id="rId12"/>
+    <p:sldId id="268" r:id="rId13"/>
+    <p:sldId id="269" r:id="rId14"/>
   </p:sldIdLst>
   <p:sldSz cx="12192000" cy="6858000"/>
   <p:notesSz cx="6858000" cy="9144000"/>
@@ -119,6 +125,440 @@
     </p:ext>
   </p:extLst>
 </p:presentation>
+</file>
+
+<file path=ppt/notesMasters/notesMaster1.xml><?xml version="1.0" encoding="utf-8"?>
+<p:notesMaster xmlns:a="http://schemas.openxmlformats.org/drawingml/2006/main" xmlns:r="http://schemas.openxmlformats.org/officeDocument/2006/relationships" xmlns:p="http://schemas.openxmlformats.org/presentationml/2006/main">
+  <p:cSld>
+    <p:bg>
+      <p:bgRef idx="1001">
+        <a:schemeClr val="bg1"/>
+      </p:bgRef>
+    </p:bg>
+    <p:spTree>
+      <p:nvGrpSpPr>
+        <p:cNvPr id="1" name=""/>
+        <p:cNvGrpSpPr/>
+        <p:nvPr/>
+      </p:nvGrpSpPr>
+      <p:grpSpPr>
+        <a:xfrm>
+          <a:off x="0" y="0"/>
+          <a:ext cx="0" cy="0"/>
+          <a:chOff x="0" y="0"/>
+          <a:chExt cx="0" cy="0"/>
+        </a:xfrm>
+      </p:grpSpPr>
+      <p:sp>
+        <p:nvSpPr>
+          <p:cNvPr id="2" name="Header Placeholder 1"/>
+          <p:cNvSpPr>
+            <a:spLocks noGrp="1"/>
+          </p:cNvSpPr>
+          <p:nvPr>
+            <p:ph type="hdr" sz="quarter"/>
+          </p:nvPr>
+        </p:nvSpPr>
+        <p:spPr>
+          <a:xfrm>
+            <a:off x="0" y="0"/>
+            <a:ext cx="2971800" cy="458788"/>
+          </a:xfrm>
+          <a:prstGeom prst="rect">
+            <a:avLst/>
+          </a:prstGeom>
+        </p:spPr>
+        <p:txBody>
+          <a:bodyPr vert="horz" lIns="91440" tIns="45720" rIns="91440" bIns="45720" rtlCol="0"/>
+          <a:lstStyle>
+            <a:lvl1pPr algn="l">
+              <a:defRPr sz="1200"/>
+            </a:lvl1pPr>
+          </a:lstStyle>
+          <a:p>
+            <a:endParaRPr lang="en-CH"/>
+          </a:p>
+        </p:txBody>
+      </p:sp>
+      <p:sp>
+        <p:nvSpPr>
+          <p:cNvPr id="3" name="Date Placeholder 2"/>
+          <p:cNvSpPr>
+            <a:spLocks noGrp="1"/>
+          </p:cNvSpPr>
+          <p:nvPr>
+            <p:ph type="dt" idx="1"/>
+          </p:nvPr>
+        </p:nvSpPr>
+        <p:spPr>
+          <a:xfrm>
+            <a:off x="3884613" y="0"/>
+            <a:ext cx="2971800" cy="458788"/>
+          </a:xfrm>
+          <a:prstGeom prst="rect">
+            <a:avLst/>
+          </a:prstGeom>
+        </p:spPr>
+        <p:txBody>
+          <a:bodyPr vert="horz" lIns="91440" tIns="45720" rIns="91440" bIns="45720" rtlCol="0"/>
+          <a:lstStyle>
+            <a:lvl1pPr algn="r">
+              <a:defRPr sz="1200"/>
+            </a:lvl1pPr>
+          </a:lstStyle>
+          <a:p>
+            <a:fld id="{6C6A9F39-3F46-044D-B888-F94ADAE94901}" type="datetimeFigureOut">
+              <a:rPr lang="en-CH" smtClean="0"/>
+              <a:t>04.12.2023</a:t>
+            </a:fld>
+            <a:endParaRPr lang="en-CH"/>
+          </a:p>
+        </p:txBody>
+      </p:sp>
+      <p:sp>
+        <p:nvSpPr>
+          <p:cNvPr id="4" name="Slide Image Placeholder 3"/>
+          <p:cNvSpPr>
+            <a:spLocks noGrp="1" noRot="1" noChangeAspect="1"/>
+          </p:cNvSpPr>
+          <p:nvPr>
+            <p:ph type="sldImg" idx="2"/>
+          </p:nvPr>
+        </p:nvSpPr>
+        <p:spPr>
+          <a:xfrm>
+            <a:off x="685800" y="1143000"/>
+            <a:ext cx="5486400" cy="3086100"/>
+          </a:xfrm>
+          <a:prstGeom prst="rect">
+            <a:avLst/>
+          </a:prstGeom>
+          <a:noFill/>
+          <a:ln w="12700">
+            <a:solidFill>
+              <a:prstClr val="black"/>
+            </a:solidFill>
+          </a:ln>
+        </p:spPr>
+        <p:txBody>
+          <a:bodyPr vert="horz" lIns="91440" tIns="45720" rIns="91440" bIns="45720" rtlCol="0" anchor="ctr"/>
+          <a:lstStyle/>
+          <a:p>
+            <a:endParaRPr lang="en-CH"/>
+          </a:p>
+        </p:txBody>
+      </p:sp>
+      <p:sp>
+        <p:nvSpPr>
+          <p:cNvPr id="5" name="Notes Placeholder 4"/>
+          <p:cNvSpPr>
+            <a:spLocks noGrp="1"/>
+          </p:cNvSpPr>
+          <p:nvPr>
+            <p:ph type="body" sz="quarter" idx="3"/>
+          </p:nvPr>
+        </p:nvSpPr>
+        <p:spPr>
+          <a:xfrm>
+            <a:off x="685800" y="4400550"/>
+            <a:ext cx="5486400" cy="3600450"/>
+          </a:xfrm>
+          <a:prstGeom prst="rect">
+            <a:avLst/>
+          </a:prstGeom>
+        </p:spPr>
+        <p:txBody>
+          <a:bodyPr vert="horz" lIns="91440" tIns="45720" rIns="91440" bIns="45720" rtlCol="0"/>
+          <a:lstStyle/>
+          <a:p>
+            <a:pPr lvl="0"/>
+            <a:r>
+              <a:rPr lang="en-GB"/>
+              <a:t>Click to edit Master text styles</a:t>
+            </a:r>
+          </a:p>
+          <a:p>
+            <a:pPr lvl="1"/>
+            <a:r>
+              <a:rPr lang="en-GB"/>
+              <a:t>Second level</a:t>
+            </a:r>
+          </a:p>
+          <a:p>
+            <a:pPr lvl="2"/>
+            <a:r>
+              <a:rPr lang="en-GB"/>
+              <a:t>Third level</a:t>
+            </a:r>
+          </a:p>
+          <a:p>
+            <a:pPr lvl="3"/>
+            <a:r>
+              <a:rPr lang="en-GB"/>
+              <a:t>Fourth level</a:t>
+            </a:r>
+          </a:p>
+          <a:p>
+            <a:pPr lvl="4"/>
+            <a:r>
+              <a:rPr lang="en-GB"/>
+              <a:t>Fifth level</a:t>
+            </a:r>
+            <a:endParaRPr lang="en-CH"/>
+          </a:p>
+        </p:txBody>
+      </p:sp>
+      <p:sp>
+        <p:nvSpPr>
+          <p:cNvPr id="6" name="Footer Placeholder 5"/>
+          <p:cNvSpPr>
+            <a:spLocks noGrp="1"/>
+          </p:cNvSpPr>
+          <p:nvPr>
+            <p:ph type="ftr" sz="quarter" idx="4"/>
+          </p:nvPr>
+        </p:nvSpPr>
+        <p:spPr>
+          <a:xfrm>
+            <a:off x="0" y="8685213"/>
+            <a:ext cx="2971800" cy="458787"/>
+          </a:xfrm>
+          <a:prstGeom prst="rect">
+            <a:avLst/>
+          </a:prstGeom>
+        </p:spPr>
+        <p:txBody>
+          <a:bodyPr vert="horz" lIns="91440" tIns="45720" rIns="91440" bIns="45720" rtlCol="0" anchor="b"/>
+          <a:lstStyle>
+            <a:lvl1pPr algn="l">
+              <a:defRPr sz="1200"/>
+            </a:lvl1pPr>
+          </a:lstStyle>
+          <a:p>
+            <a:endParaRPr lang="en-CH"/>
+          </a:p>
+        </p:txBody>
+      </p:sp>
+      <p:sp>
+        <p:nvSpPr>
+          <p:cNvPr id="7" name="Slide Number Placeholder 6"/>
+          <p:cNvSpPr>
+            <a:spLocks noGrp="1"/>
+          </p:cNvSpPr>
+          <p:nvPr>
+            <p:ph type="sldNum" sz="quarter" idx="5"/>
+          </p:nvPr>
+        </p:nvSpPr>
+        <p:spPr>
+          <a:xfrm>
+            <a:off x="3884613" y="8685213"/>
+            <a:ext cx="2971800" cy="458787"/>
+          </a:xfrm>
+          <a:prstGeom prst="rect">
+            <a:avLst/>
+          </a:prstGeom>
+        </p:spPr>
+        <p:txBody>
+          <a:bodyPr vert="horz" lIns="91440" tIns="45720" rIns="91440" bIns="45720" rtlCol="0" anchor="b"/>
+          <a:lstStyle>
+            <a:lvl1pPr algn="r">
+              <a:defRPr sz="1200"/>
+            </a:lvl1pPr>
+          </a:lstStyle>
+          <a:p>
+            <a:fld id="{51AB7BE0-FC7C-784A-AB42-81059BFB98AB}" type="slidenum">
+              <a:rPr lang="en-CH" smtClean="0"/>
+              <a:t>‹#›</a:t>
+            </a:fld>
+            <a:endParaRPr lang="en-CH"/>
+          </a:p>
+        </p:txBody>
+      </p:sp>
+    </p:spTree>
+    <p:extLst>
+      <p:ext uri="{BB962C8B-B14F-4D97-AF65-F5344CB8AC3E}">
+        <p14:creationId xmlns:p14="http://schemas.microsoft.com/office/powerpoint/2010/main" val="2119650734"/>
+      </p:ext>
+    </p:extLst>
+  </p:cSld>
+  <p:clrMap bg1="lt1" tx1="dk1" bg2="lt2" tx2="dk2" accent1="accent1" accent2="accent2" accent3="accent3" accent4="accent4" accent5="accent5" accent6="accent6" hlink="hlink" folHlink="folHlink"/>
+  <p:notesStyle>
+    <a:lvl1pPr marL="0" algn="l" defTabSz="914400" rtl="0" eaLnBrk="1" latinLnBrk="0" hangingPunct="1">
+      <a:defRPr sz="1200" kern="1200">
+        <a:solidFill>
+          <a:schemeClr val="tx1"/>
+        </a:solidFill>
+        <a:latin typeface="+mn-lt"/>
+        <a:ea typeface="+mn-ea"/>
+        <a:cs typeface="+mn-cs"/>
+      </a:defRPr>
+    </a:lvl1pPr>
+    <a:lvl2pPr marL="457200" algn="l" defTabSz="914400" rtl="0" eaLnBrk="1" latinLnBrk="0" hangingPunct="1">
+      <a:defRPr sz="1200" kern="1200">
+        <a:solidFill>
+          <a:schemeClr val="tx1"/>
+        </a:solidFill>
+        <a:latin typeface="+mn-lt"/>
+        <a:ea typeface="+mn-ea"/>
+        <a:cs typeface="+mn-cs"/>
+      </a:defRPr>
+    </a:lvl2pPr>
+    <a:lvl3pPr marL="914400" algn="l" defTabSz="914400" rtl="0" eaLnBrk="1" latinLnBrk="0" hangingPunct="1">
+      <a:defRPr sz="1200" kern="1200">
+        <a:solidFill>
+          <a:schemeClr val="tx1"/>
+        </a:solidFill>
+        <a:latin typeface="+mn-lt"/>
+        <a:ea typeface="+mn-ea"/>
+        <a:cs typeface="+mn-cs"/>
+      </a:defRPr>
+    </a:lvl3pPr>
+    <a:lvl4pPr marL="1371600" algn="l" defTabSz="914400" rtl="0" eaLnBrk="1" latinLnBrk="0" hangingPunct="1">
+      <a:defRPr sz="1200" kern="1200">
+        <a:solidFill>
+          <a:schemeClr val="tx1"/>
+        </a:solidFill>
+        <a:latin typeface="+mn-lt"/>
+        <a:ea typeface="+mn-ea"/>
+        <a:cs typeface="+mn-cs"/>
+      </a:defRPr>
+    </a:lvl4pPr>
+    <a:lvl5pPr marL="1828800" algn="l" defTabSz="914400" rtl="0" eaLnBrk="1" latinLnBrk="0" hangingPunct="1">
+      <a:defRPr sz="1200" kern="1200">
+        <a:solidFill>
+          <a:schemeClr val="tx1"/>
+        </a:solidFill>
+        <a:latin typeface="+mn-lt"/>
+        <a:ea typeface="+mn-ea"/>
+        <a:cs typeface="+mn-cs"/>
+      </a:defRPr>
+    </a:lvl5pPr>
+    <a:lvl6pPr marL="2286000" algn="l" defTabSz="914400" rtl="0" eaLnBrk="1" latinLnBrk="0" hangingPunct="1">
+      <a:defRPr sz="1200" kern="1200">
+        <a:solidFill>
+          <a:schemeClr val="tx1"/>
+        </a:solidFill>
+        <a:latin typeface="+mn-lt"/>
+        <a:ea typeface="+mn-ea"/>
+        <a:cs typeface="+mn-cs"/>
+      </a:defRPr>
+    </a:lvl6pPr>
+    <a:lvl7pPr marL="2743200" algn="l" defTabSz="914400" rtl="0" eaLnBrk="1" latinLnBrk="0" hangingPunct="1">
+      <a:defRPr sz="1200" kern="1200">
+        <a:solidFill>
+          <a:schemeClr val="tx1"/>
+        </a:solidFill>
+        <a:latin typeface="+mn-lt"/>
+        <a:ea typeface="+mn-ea"/>
+        <a:cs typeface="+mn-cs"/>
+      </a:defRPr>
+    </a:lvl7pPr>
+    <a:lvl8pPr marL="3200400" algn="l" defTabSz="914400" rtl="0" eaLnBrk="1" latinLnBrk="0" hangingPunct="1">
+      <a:defRPr sz="1200" kern="1200">
+        <a:solidFill>
+          <a:schemeClr val="tx1"/>
+        </a:solidFill>
+        <a:latin typeface="+mn-lt"/>
+        <a:ea typeface="+mn-ea"/>
+        <a:cs typeface="+mn-cs"/>
+      </a:defRPr>
+    </a:lvl8pPr>
+    <a:lvl9pPr marL="3657600" algn="l" defTabSz="914400" rtl="0" eaLnBrk="1" latinLnBrk="0" hangingPunct="1">
+      <a:defRPr sz="1200" kern="1200">
+        <a:solidFill>
+          <a:schemeClr val="tx1"/>
+        </a:solidFill>
+        <a:latin typeface="+mn-lt"/>
+        <a:ea typeface="+mn-ea"/>
+        <a:cs typeface="+mn-cs"/>
+      </a:defRPr>
+    </a:lvl9pPr>
+  </p:notesStyle>
+</p:notesMaster>
+</file>
+
+<file path=ppt/notesSlides/notesSlide1.xml><?xml version="1.0" encoding="utf-8"?>
+<p:notes xmlns:a="http://schemas.openxmlformats.org/drawingml/2006/main" xmlns:r="http://schemas.openxmlformats.org/officeDocument/2006/relationships" xmlns:p="http://schemas.openxmlformats.org/presentationml/2006/main">
+  <p:cSld>
+    <p:spTree>
+      <p:nvGrpSpPr>
+        <p:cNvPr id="1" name=""/>
+        <p:cNvGrpSpPr/>
+        <p:nvPr/>
+      </p:nvGrpSpPr>
+      <p:grpSpPr>
+        <a:xfrm>
+          <a:off x="0" y="0"/>
+          <a:ext cx="0" cy="0"/>
+          <a:chOff x="0" y="0"/>
+          <a:chExt cx="0" cy="0"/>
+        </a:xfrm>
+      </p:grpSpPr>
+      <p:sp>
+        <p:nvSpPr>
+          <p:cNvPr id="2" name="Slide Image Placeholder 1"/>
+          <p:cNvSpPr>
+            <a:spLocks noGrp="1" noRot="1" noChangeAspect="1"/>
+          </p:cNvSpPr>
+          <p:nvPr>
+            <p:ph type="sldImg"/>
+          </p:nvPr>
+        </p:nvSpPr>
+        <p:spPr/>
+      </p:sp>
+      <p:sp>
+        <p:nvSpPr>
+          <p:cNvPr id="3" name="Notes Placeholder 2"/>
+          <p:cNvSpPr>
+            <a:spLocks noGrp="1"/>
+          </p:cNvSpPr>
+          <p:nvPr>
+            <p:ph type="body" idx="1"/>
+          </p:nvPr>
+        </p:nvSpPr>
+        <p:spPr/>
+        <p:txBody>
+          <a:bodyPr/>
+          <a:lstStyle/>
+          <a:p>
+            <a:endParaRPr lang="en-CH" dirty="0"/>
+          </a:p>
+        </p:txBody>
+      </p:sp>
+      <p:sp>
+        <p:nvSpPr>
+          <p:cNvPr id="4" name="Slide Number Placeholder 3"/>
+          <p:cNvSpPr>
+            <a:spLocks noGrp="1"/>
+          </p:cNvSpPr>
+          <p:nvPr>
+            <p:ph type="sldNum" sz="quarter" idx="5"/>
+          </p:nvPr>
+        </p:nvSpPr>
+        <p:spPr/>
+        <p:txBody>
+          <a:bodyPr/>
+          <a:lstStyle/>
+          <a:p>
+            <a:fld id="{51AB7BE0-FC7C-784A-AB42-81059BFB98AB}" type="slidenum">
+              <a:rPr lang="en-CH" smtClean="0"/>
+              <a:t>9</a:t>
+            </a:fld>
+            <a:endParaRPr lang="en-CH"/>
+          </a:p>
+        </p:txBody>
+      </p:sp>
+    </p:spTree>
+    <p:extLst>
+      <p:ext uri="{BB962C8B-B14F-4D97-AF65-F5344CB8AC3E}">
+        <p14:creationId xmlns:p14="http://schemas.microsoft.com/office/powerpoint/2010/main" val="2058222203"/>
+      </p:ext>
+    </p:extLst>
+  </p:cSld>
+  <p:clrMapOvr>
+    <a:masterClrMapping/>
+  </p:clrMapOvr>
+</p:notes>
 </file>
 
 <file path=ppt/slideLayouts/slideLayout1.xml><?xml version="1.0" encoding="utf-8"?>
@@ -3406,6 +3846,308 @@
           <p:cNvPr id="2" name="Title 1">
             <a:extLst>
               <a:ext uri="{FF2B5EF4-FFF2-40B4-BE49-F238E27FC236}">
+                <a16:creationId xmlns:a16="http://schemas.microsoft.com/office/drawing/2014/main" id="{2A227F88-9D0E-BE0B-889A-2A6314B9C61B}"/>
+              </a:ext>
+            </a:extLst>
+          </p:cNvPr>
+          <p:cNvSpPr>
+            <a:spLocks noGrp="1"/>
+          </p:cNvSpPr>
+          <p:nvPr>
+            <p:ph type="ctrTitle"/>
+          </p:nvPr>
+        </p:nvSpPr>
+        <p:spPr/>
+        <p:txBody>
+          <a:bodyPr/>
+          <a:lstStyle/>
+          <a:p>
+            <a:r>
+              <a:rPr lang="en-CH" dirty="0">
+                <a:latin typeface="+mn-lt"/>
+              </a:rPr>
+              <a:t>OpenAI / ChatGPT</a:t>
+            </a:r>
+          </a:p>
+        </p:txBody>
+      </p:sp>
+    </p:spTree>
+    <p:extLst>
+      <p:ext uri="{BB962C8B-B14F-4D97-AF65-F5344CB8AC3E}">
+        <p14:creationId xmlns:p14="http://schemas.microsoft.com/office/powerpoint/2010/main" val="1170456708"/>
+      </p:ext>
+    </p:extLst>
+  </p:cSld>
+  <p:clrMapOvr>
+    <a:masterClrMapping/>
+  </p:clrMapOvr>
+  <mc:AlternateContent xmlns:mc="http://schemas.openxmlformats.org/markup-compatibility/2006" xmlns:p14="http://schemas.microsoft.com/office/powerpoint/2010/main">
+    <mc:Choice Requires="p14">
+      <p:transition spd="med" p14:dur="700">
+        <p:fade/>
+      </p:transition>
+    </mc:Choice>
+    <mc:Fallback xmlns="">
+      <p:transition spd="med">
+        <p:fade/>
+      </p:transition>
+    </mc:Fallback>
+  </mc:AlternateContent>
+</p:sld>
+</file>
+
+<file path=ppt/slides/slide11.xml><?xml version="1.0" encoding="utf-8"?>
+<p:sld xmlns:a="http://schemas.openxmlformats.org/drawingml/2006/main" xmlns:r="http://schemas.openxmlformats.org/officeDocument/2006/relationships" xmlns:p="http://schemas.openxmlformats.org/presentationml/2006/main">
+  <p:cSld>
+    <p:spTree>
+      <p:nvGrpSpPr>
+        <p:cNvPr id="1" name=""/>
+        <p:cNvGrpSpPr/>
+        <p:nvPr/>
+      </p:nvGrpSpPr>
+      <p:grpSpPr>
+        <a:xfrm>
+          <a:off x="0" y="0"/>
+          <a:ext cx="0" cy="0"/>
+          <a:chOff x="0" y="0"/>
+          <a:chExt cx="0" cy="0"/>
+        </a:xfrm>
+      </p:grpSpPr>
+      <p:sp>
+        <p:nvSpPr>
+          <p:cNvPr id="2" name="Title 1">
+            <a:extLst>
+              <a:ext uri="{FF2B5EF4-FFF2-40B4-BE49-F238E27FC236}">
+                <a16:creationId xmlns:a16="http://schemas.microsoft.com/office/drawing/2014/main" id="{654F7022-7E66-4FE2-DADF-5F23867E667E}"/>
+              </a:ext>
+            </a:extLst>
+          </p:cNvPr>
+          <p:cNvSpPr>
+            <a:spLocks noGrp="1"/>
+          </p:cNvSpPr>
+          <p:nvPr>
+            <p:ph type="title"/>
+          </p:nvPr>
+        </p:nvSpPr>
+        <p:spPr/>
+        <p:txBody>
+          <a:bodyPr/>
+          <a:lstStyle/>
+          <a:p>
+            <a:pPr algn="ctr"/>
+            <a:r>
+              <a:rPr lang="en-CH" dirty="0"/>
+              <a:t>Was ist ChatGPT</a:t>
+            </a:r>
+          </a:p>
+        </p:txBody>
+      </p:sp>
+      <p:sp>
+        <p:nvSpPr>
+          <p:cNvPr id="4" name="Content Placeholder 2">
+            <a:extLst>
+              <a:ext uri="{FF2B5EF4-FFF2-40B4-BE49-F238E27FC236}">
+                <a16:creationId xmlns:a16="http://schemas.microsoft.com/office/drawing/2014/main" id="{573F10B5-0D28-8B48-8D98-2764751FC02E}"/>
+              </a:ext>
+            </a:extLst>
+          </p:cNvPr>
+          <p:cNvSpPr>
+            <a:spLocks noGrp="1"/>
+          </p:cNvSpPr>
+          <p:nvPr>
+            <p:ph idx="1"/>
+          </p:nvPr>
+        </p:nvSpPr>
+        <p:spPr>
+          <a:xfrm>
+            <a:off x="838200" y="1825625"/>
+            <a:ext cx="10515600" cy="4351338"/>
+          </a:xfrm>
+        </p:spPr>
+        <p:txBody>
+          <a:bodyPr/>
+          <a:lstStyle/>
+          <a:p>
+            <a:r>
+              <a:rPr lang="en-CH" dirty="0"/>
+              <a:t>Chatbot</a:t>
+            </a:r>
+          </a:p>
+          <a:p>
+            <a:r>
+              <a:rPr lang="en-CH" dirty="0"/>
+              <a:t>Künstliche “Intelligenz”</a:t>
+            </a:r>
+          </a:p>
+          <a:p>
+            <a:endParaRPr lang="en-CH" dirty="0"/>
+          </a:p>
+        </p:txBody>
+      </p:sp>
+    </p:spTree>
+    <p:extLst>
+      <p:ext uri="{BB962C8B-B14F-4D97-AF65-F5344CB8AC3E}">
+        <p14:creationId xmlns:p14="http://schemas.microsoft.com/office/powerpoint/2010/main" val="682729952"/>
+      </p:ext>
+    </p:extLst>
+  </p:cSld>
+  <p:clrMapOvr>
+    <a:masterClrMapping/>
+  </p:clrMapOvr>
+  <mc:AlternateContent xmlns:mc="http://schemas.openxmlformats.org/markup-compatibility/2006" xmlns:p14="http://schemas.microsoft.com/office/powerpoint/2010/main">
+    <mc:Choice Requires="p14">
+      <p:transition spd="med" p14:dur="700">
+        <p:fade/>
+      </p:transition>
+    </mc:Choice>
+    <mc:Fallback xmlns="">
+      <p:transition spd="med">
+        <p:fade/>
+      </p:transition>
+    </mc:Fallback>
+  </mc:AlternateContent>
+</p:sld>
+</file>
+
+<file path=ppt/slides/slide12.xml><?xml version="1.0" encoding="utf-8"?>
+<p:sld xmlns:a="http://schemas.openxmlformats.org/drawingml/2006/main" xmlns:r="http://schemas.openxmlformats.org/officeDocument/2006/relationships" xmlns:p="http://schemas.openxmlformats.org/presentationml/2006/main">
+  <p:cSld>
+    <p:spTree>
+      <p:nvGrpSpPr>
+        <p:cNvPr id="1" name=""/>
+        <p:cNvGrpSpPr/>
+        <p:nvPr/>
+      </p:nvGrpSpPr>
+      <p:grpSpPr>
+        <a:xfrm>
+          <a:off x="0" y="0"/>
+          <a:ext cx="0" cy="0"/>
+          <a:chOff x="0" y="0"/>
+          <a:chExt cx="0" cy="0"/>
+        </a:xfrm>
+      </p:grpSpPr>
+      <p:sp>
+        <p:nvSpPr>
+          <p:cNvPr id="2" name="Title 1">
+            <a:extLst>
+              <a:ext uri="{FF2B5EF4-FFF2-40B4-BE49-F238E27FC236}">
+                <a16:creationId xmlns:a16="http://schemas.microsoft.com/office/drawing/2014/main" id="{37F4DEC1-7743-65B5-7AF4-6D99342A3370}"/>
+              </a:ext>
+            </a:extLst>
+          </p:cNvPr>
+          <p:cNvSpPr>
+            <a:spLocks noGrp="1"/>
+          </p:cNvSpPr>
+          <p:nvPr>
+            <p:ph type="title"/>
+          </p:nvPr>
+        </p:nvSpPr>
+        <p:spPr/>
+        <p:txBody>
+          <a:bodyPr/>
+          <a:lstStyle/>
+          <a:p>
+            <a:pPr algn="ctr"/>
+            <a:r>
+              <a:rPr lang="en-CH" dirty="0"/>
+              <a:t>AIs von OpenAI</a:t>
+            </a:r>
+          </a:p>
+        </p:txBody>
+      </p:sp>
+      <p:sp>
+        <p:nvSpPr>
+          <p:cNvPr id="3" name="Content Placeholder 2">
+            <a:extLst>
+              <a:ext uri="{FF2B5EF4-FFF2-40B4-BE49-F238E27FC236}">
+                <a16:creationId xmlns:a16="http://schemas.microsoft.com/office/drawing/2014/main" id="{8DD2D7CD-ED6A-F198-CDCF-FE3383811B0B}"/>
+              </a:ext>
+            </a:extLst>
+          </p:cNvPr>
+          <p:cNvSpPr>
+            <a:spLocks noGrp="1"/>
+          </p:cNvSpPr>
+          <p:nvPr>
+            <p:ph idx="1"/>
+          </p:nvPr>
+        </p:nvSpPr>
+        <p:spPr/>
+        <p:txBody>
+          <a:bodyPr/>
+          <a:lstStyle/>
+          <a:p>
+            <a:r>
+              <a:rPr lang="en-CH" b="1" dirty="0"/>
+              <a:t>GPT-4 (Text Generierung)</a:t>
+            </a:r>
+          </a:p>
+          <a:p>
+            <a:r>
+              <a:rPr lang="en-CH" b="1" dirty="0"/>
+              <a:t>Dall-E-2 (Bilder Generierung)</a:t>
+            </a:r>
+          </a:p>
+          <a:p>
+            <a:r>
+              <a:rPr lang="en-CH" dirty="0"/>
+              <a:t>TTS (Text-To-Speech)</a:t>
+            </a:r>
+          </a:p>
+          <a:p>
+            <a:r>
+              <a:rPr lang="en-CH" dirty="0"/>
+              <a:t>Whisper (Speech-To-Text)</a:t>
+            </a:r>
+          </a:p>
+        </p:txBody>
+      </p:sp>
+    </p:spTree>
+    <p:extLst>
+      <p:ext uri="{BB962C8B-B14F-4D97-AF65-F5344CB8AC3E}">
+        <p14:creationId xmlns:p14="http://schemas.microsoft.com/office/powerpoint/2010/main" val="1010253080"/>
+      </p:ext>
+    </p:extLst>
+  </p:cSld>
+  <p:clrMapOvr>
+    <a:masterClrMapping/>
+  </p:clrMapOvr>
+  <mc:AlternateContent xmlns:mc="http://schemas.openxmlformats.org/markup-compatibility/2006" xmlns:p14="http://schemas.microsoft.com/office/powerpoint/2010/main">
+    <mc:Choice Requires="p14">
+      <p:transition spd="med" p14:dur="700">
+        <p:fade/>
+      </p:transition>
+    </mc:Choice>
+    <mc:Fallback xmlns="">
+      <p:transition spd="med">
+        <p:fade/>
+      </p:transition>
+    </mc:Fallback>
+  </mc:AlternateContent>
+</p:sld>
+</file>
+
+<file path=ppt/slides/slide13.xml><?xml version="1.0" encoding="utf-8"?>
+<p:sld xmlns:a="http://schemas.openxmlformats.org/drawingml/2006/main" xmlns:r="http://schemas.openxmlformats.org/officeDocument/2006/relationships" xmlns:p="http://schemas.openxmlformats.org/presentationml/2006/main">
+  <p:cSld>
+    <p:spTree>
+      <p:nvGrpSpPr>
+        <p:cNvPr id="1" name=""/>
+        <p:cNvGrpSpPr/>
+        <p:nvPr/>
+      </p:nvGrpSpPr>
+      <p:grpSpPr>
+        <a:xfrm>
+          <a:off x="0" y="0"/>
+          <a:ext cx="0" cy="0"/>
+          <a:chOff x="0" y="0"/>
+          <a:chExt cx="0" cy="0"/>
+        </a:xfrm>
+      </p:grpSpPr>
+      <p:sp>
+        <p:nvSpPr>
+          <p:cNvPr id="2" name="Title 1">
+            <a:extLst>
+              <a:ext uri="{FF2B5EF4-FFF2-40B4-BE49-F238E27FC236}">
                 <a16:creationId xmlns:a16="http://schemas.microsoft.com/office/drawing/2014/main" id="{F932472D-5E41-8E44-EF24-02F0F6FF6281}"/>
               </a:ext>
             </a:extLst>
@@ -3460,96 +4202,6 @@
           <a:chExt cx="0" cy="0"/>
         </a:xfrm>
       </p:grpSpPr>
-      <p:pic>
-        <p:nvPicPr>
-          <p:cNvPr id="6" name="Picture 5">
-            <a:extLst>
-              <a:ext uri="{FF2B5EF4-FFF2-40B4-BE49-F238E27FC236}">
-                <a16:creationId xmlns:a16="http://schemas.microsoft.com/office/drawing/2014/main" id="{2A355177-FD37-05AD-56C3-7EA86033A284}"/>
-              </a:ext>
-            </a:extLst>
-          </p:cNvPr>
-          <p:cNvPicPr>
-            <a:picLocks noChangeAspect="1"/>
-          </p:cNvPicPr>
-          <p:nvPr/>
-        </p:nvPicPr>
-        <p:blipFill>
-          <a:blip r:embed="rId2"/>
-          <a:stretch>
-            <a:fillRect/>
-          </a:stretch>
-        </p:blipFill>
-        <p:spPr>
-          <a:xfrm>
-            <a:off x="5163916" y="2726352"/>
-            <a:ext cx="1864167" cy="1405295"/>
-          </a:xfrm>
-          <a:prstGeom prst="rect">
-            <a:avLst/>
-          </a:prstGeom>
-        </p:spPr>
-      </p:pic>
-      <p:pic>
-        <p:nvPicPr>
-          <p:cNvPr id="4" name="Picture 3">
-            <a:extLst>
-              <a:ext uri="{FF2B5EF4-FFF2-40B4-BE49-F238E27FC236}">
-                <a16:creationId xmlns:a16="http://schemas.microsoft.com/office/drawing/2014/main" id="{9184E88F-787D-C7FC-036C-2A4322EA2BB7}"/>
-              </a:ext>
-            </a:extLst>
-          </p:cNvPr>
-          <p:cNvPicPr>
-            <a:picLocks noChangeAspect="1"/>
-          </p:cNvPicPr>
-          <p:nvPr/>
-        </p:nvPicPr>
-        <p:blipFill>
-          <a:blip r:embed="rId3"/>
-          <a:stretch>
-            <a:fillRect/>
-          </a:stretch>
-        </p:blipFill>
-        <p:spPr>
-          <a:xfrm>
-            <a:off x="461840" y="3019133"/>
-            <a:ext cx="3537345" cy="813589"/>
-          </a:xfrm>
-          <a:prstGeom prst="rect">
-            <a:avLst/>
-          </a:prstGeom>
-        </p:spPr>
-      </p:pic>
-      <p:pic>
-        <p:nvPicPr>
-          <p:cNvPr id="5" name="Picture 4">
-            <a:extLst>
-              <a:ext uri="{FF2B5EF4-FFF2-40B4-BE49-F238E27FC236}">
-                <a16:creationId xmlns:a16="http://schemas.microsoft.com/office/drawing/2014/main" id="{9641109A-FEA4-786D-89A7-C0672BC70C5F}"/>
-              </a:ext>
-            </a:extLst>
-          </p:cNvPr>
-          <p:cNvPicPr>
-            <a:picLocks noChangeAspect="1"/>
-          </p:cNvPicPr>
-          <p:nvPr/>
-        </p:nvPicPr>
-        <p:blipFill>
-          <a:blip r:embed="rId4"/>
-          <a:stretch>
-            <a:fillRect/>
-          </a:stretch>
-        </p:blipFill>
-        <p:spPr>
-          <a:xfrm>
-            <a:off x="8162336" y="2841207"/>
-            <a:ext cx="3517120" cy="1169442"/>
-          </a:xfrm>
-          <a:prstGeom prst="rect">
-            <a:avLst/>
-          </a:prstGeom>
-        </p:spPr>
-      </p:pic>
       <p:sp>
         <p:nvSpPr>
           <p:cNvPr id="7" name="Title 1">
@@ -3631,7 +4283,7 @@
           <p:cNvPr id="2" name="Title 1">
             <a:extLst>
               <a:ext uri="{FF2B5EF4-FFF2-40B4-BE49-F238E27FC236}">
-                <a16:creationId xmlns:a16="http://schemas.microsoft.com/office/drawing/2014/main" id="{39F20681-E6BF-0195-2AFC-53A063D8D618}"/>
+                <a16:creationId xmlns:a16="http://schemas.microsoft.com/office/drawing/2014/main" id="{C65DFC1A-AE81-ED98-D2AE-302A57E3C43E}"/>
               </a:ext>
             </a:extLst>
           </p:cNvPr>
@@ -3650,7 +4302,7 @@
             <a:pPr algn="ctr"/>
             <a:r>
               <a:rPr lang="en-CH" dirty="0"/>
-              <a:t>Svelte</a:t>
+              <a:t>JavaScript</a:t>
             </a:r>
           </a:p>
         </p:txBody>
@@ -3660,7 +4312,7 @@
           <p:cNvPr id="4" name="Picture 3">
             <a:extLst>
               <a:ext uri="{FF2B5EF4-FFF2-40B4-BE49-F238E27FC236}">
-                <a16:creationId xmlns:a16="http://schemas.microsoft.com/office/drawing/2014/main" id="{F6C1A0C5-CB0F-E9D1-B972-340F6FCE3019}"/>
+                <a16:creationId xmlns:a16="http://schemas.microsoft.com/office/drawing/2014/main" id="{95AFDA86-CF1B-C912-D488-274180A4D56A}"/>
               </a:ext>
             </a:extLst>
           </p:cNvPr>
@@ -3677,8 +4329,8 @@
         </p:blipFill>
         <p:spPr>
           <a:xfrm>
-            <a:off x="3808520" y="1690688"/>
-            <a:ext cx="4574960" cy="5307378"/>
+            <a:off x="2209800" y="2009042"/>
+            <a:ext cx="7772400" cy="2839915"/>
           </a:xfrm>
           <a:prstGeom prst="rect">
             <a:avLst/>
@@ -3688,25 +4340,13 @@
     </p:spTree>
     <p:extLst>
       <p:ext uri="{BB962C8B-B14F-4D97-AF65-F5344CB8AC3E}">
-        <p14:creationId xmlns:p14="http://schemas.microsoft.com/office/powerpoint/2010/main" val="13975664"/>
+        <p14:creationId xmlns:p14="http://schemas.microsoft.com/office/powerpoint/2010/main" val="3434281533"/>
       </p:ext>
     </p:extLst>
   </p:cSld>
   <p:clrMapOvr>
     <a:masterClrMapping/>
   </p:clrMapOvr>
-  <mc:AlternateContent xmlns:mc="http://schemas.openxmlformats.org/markup-compatibility/2006" xmlns:p14="http://schemas.microsoft.com/office/powerpoint/2010/main">
-    <mc:Choice Requires="p14">
-      <p:transition spd="med" p14:dur="700">
-        <p:fade/>
-      </p:transition>
-    </mc:Choice>
-    <mc:Fallback xmlns="">
-      <p:transition spd="med">
-        <p:fade/>
-      </p:transition>
-    </mc:Fallback>
-  </mc:AlternateContent>
 </p:sld>
 </file>
 
@@ -3727,12 +4367,41 @@
           <a:chExt cx="0" cy="0"/>
         </a:xfrm>
       </p:grpSpPr>
+      <p:sp>
+        <p:nvSpPr>
+          <p:cNvPr id="2" name="Title 1">
+            <a:extLst>
+              <a:ext uri="{FF2B5EF4-FFF2-40B4-BE49-F238E27FC236}">
+                <a16:creationId xmlns:a16="http://schemas.microsoft.com/office/drawing/2014/main" id="{C65DFC1A-AE81-ED98-D2AE-302A57E3C43E}"/>
+              </a:ext>
+            </a:extLst>
+          </p:cNvPr>
+          <p:cNvSpPr>
+            <a:spLocks noGrp="1"/>
+          </p:cNvSpPr>
+          <p:nvPr>
+            <p:ph type="title"/>
+          </p:nvPr>
+        </p:nvSpPr>
+        <p:spPr/>
+        <p:txBody>
+          <a:bodyPr/>
+          <a:lstStyle/>
+          <a:p>
+            <a:pPr algn="ctr"/>
+            <a:r>
+              <a:rPr lang="en-CH" dirty="0"/>
+              <a:t>HTML</a:t>
+            </a:r>
+          </a:p>
+        </p:txBody>
+      </p:sp>
       <p:pic>
         <p:nvPicPr>
           <p:cNvPr id="3" name="Picture 2">
             <a:extLst>
               <a:ext uri="{FF2B5EF4-FFF2-40B4-BE49-F238E27FC236}">
-                <a16:creationId xmlns:a16="http://schemas.microsoft.com/office/drawing/2014/main" id="{6E9587CA-B36C-191E-A556-9AB8B7B5671C}"/>
+                <a16:creationId xmlns:a16="http://schemas.microsoft.com/office/drawing/2014/main" id="{2D885341-730B-2F7F-CE50-E50D7DB4CAE3}"/>
               </a:ext>
             </a:extLst>
           </p:cNvPr>
@@ -3749,65 +4418,24 @@
         </p:blipFill>
         <p:spPr>
           <a:xfrm>
-            <a:off x="3808519" y="1690688"/>
-            <a:ext cx="4238951" cy="1572342"/>
+            <a:off x="3175000" y="2692400"/>
+            <a:ext cx="5842000" cy="1473200"/>
           </a:xfrm>
           <a:prstGeom prst="rect">
             <a:avLst/>
           </a:prstGeom>
         </p:spPr>
       </p:pic>
-      <p:sp>
-        <p:nvSpPr>
-          <p:cNvPr id="2" name="Title 1">
-            <a:extLst>
-              <a:ext uri="{FF2B5EF4-FFF2-40B4-BE49-F238E27FC236}">
-                <a16:creationId xmlns:a16="http://schemas.microsoft.com/office/drawing/2014/main" id="{39F20681-E6BF-0195-2AFC-53A063D8D618}"/>
-              </a:ext>
-            </a:extLst>
-          </p:cNvPr>
-          <p:cNvSpPr>
-            <a:spLocks noGrp="1"/>
-          </p:cNvSpPr>
-          <p:nvPr>
-            <p:ph type="title"/>
-          </p:nvPr>
-        </p:nvSpPr>
-        <p:spPr/>
-        <p:txBody>
-          <a:bodyPr/>
-          <a:lstStyle/>
-          <a:p>
-            <a:pPr algn="ctr"/>
-            <a:r>
-              <a:rPr lang="en-CH" dirty="0"/>
-              <a:t>JavaScript</a:t>
-            </a:r>
-          </a:p>
-        </p:txBody>
-      </p:sp>
     </p:spTree>
     <p:extLst>
       <p:ext uri="{BB962C8B-B14F-4D97-AF65-F5344CB8AC3E}">
-        <p14:creationId xmlns:p14="http://schemas.microsoft.com/office/powerpoint/2010/main" val="3529868597"/>
+        <p14:creationId xmlns:p14="http://schemas.microsoft.com/office/powerpoint/2010/main" val="2391928022"/>
       </p:ext>
     </p:extLst>
   </p:cSld>
   <p:clrMapOvr>
     <a:masterClrMapping/>
   </p:clrMapOvr>
-  <mc:AlternateContent xmlns:mc="http://schemas.openxmlformats.org/markup-compatibility/2006" xmlns:p14="http://schemas.microsoft.com/office/powerpoint/2010/main">
-    <mc:Choice Requires="p14">
-      <p:transition spd="med" p14:dur="700">
-        <p:fade/>
-      </p:transition>
-    </mc:Choice>
-    <mc:Fallback xmlns="">
-      <p:transition spd="med">
-        <p:fade/>
-      </p:transition>
-    </mc:Fallback>
-  </mc:AlternateContent>
 </p:sld>
 </file>
 
@@ -3833,7 +4461,7 @@
           <p:cNvPr id="2" name="Title 1">
             <a:extLst>
               <a:ext uri="{FF2B5EF4-FFF2-40B4-BE49-F238E27FC236}">
-                <a16:creationId xmlns:a16="http://schemas.microsoft.com/office/drawing/2014/main" id="{39F20681-E6BF-0195-2AFC-53A063D8D618}"/>
+                <a16:creationId xmlns:a16="http://schemas.microsoft.com/office/drawing/2014/main" id="{C65DFC1A-AE81-ED98-D2AE-302A57E3C43E}"/>
               </a:ext>
             </a:extLst>
           </p:cNvPr>
@@ -3852,7 +4480,7 @@
             <a:pPr algn="ctr"/>
             <a:r>
               <a:rPr lang="en-CH" dirty="0"/>
-              <a:t>HTML</a:t>
+              <a:t>CSS</a:t>
             </a:r>
           </a:p>
         </p:txBody>
@@ -3862,7 +4490,7 @@
           <p:cNvPr id="3" name="Picture 2">
             <a:extLst>
               <a:ext uri="{FF2B5EF4-FFF2-40B4-BE49-F238E27FC236}">
-                <a16:creationId xmlns:a16="http://schemas.microsoft.com/office/drawing/2014/main" id="{827F90FE-A064-C635-DEE4-85AD21DB8A95}"/>
+                <a16:creationId xmlns:a16="http://schemas.microsoft.com/office/drawing/2014/main" id="{94739BF9-E72F-2095-FA99-F880609534E0}"/>
               </a:ext>
             </a:extLst>
           </p:cNvPr>
@@ -3879,8 +4507,8 @@
         </p:blipFill>
         <p:spPr>
           <a:xfrm>
-            <a:off x="3808520" y="3049780"/>
-            <a:ext cx="4574960" cy="1740820"/>
+            <a:off x="4584700" y="2184400"/>
+            <a:ext cx="3022600" cy="2489200"/>
           </a:xfrm>
           <a:prstGeom prst="rect">
             <a:avLst/>
@@ -3890,25 +4518,13 @@
     </p:spTree>
     <p:extLst>
       <p:ext uri="{BB962C8B-B14F-4D97-AF65-F5344CB8AC3E}">
-        <p14:creationId xmlns:p14="http://schemas.microsoft.com/office/powerpoint/2010/main" val="1464927195"/>
+        <p14:creationId xmlns:p14="http://schemas.microsoft.com/office/powerpoint/2010/main" val="2519286050"/>
       </p:ext>
     </p:extLst>
   </p:cSld>
   <p:clrMapOvr>
     <a:masterClrMapping/>
   </p:clrMapOvr>
-  <mc:AlternateContent xmlns:mc="http://schemas.openxmlformats.org/markup-compatibility/2006" xmlns:p14="http://schemas.microsoft.com/office/powerpoint/2010/main">
-    <mc:Choice Requires="p14">
-      <p:transition spd="med" p14:dur="700">
-        <p:fade/>
-      </p:transition>
-    </mc:Choice>
-    <mc:Fallback xmlns="">
-      <p:transition spd="med">
-        <p:fade/>
-      </p:transition>
-    </mc:Fallback>
-  </mc:AlternateContent>
 </p:sld>
 </file>
 
@@ -3953,17 +4569,17 @@
             <a:pPr algn="ctr"/>
             <a:r>
               <a:rPr lang="en-CH" dirty="0"/>
-              <a:t>CSS</a:t>
+              <a:t>Svelte</a:t>
             </a:r>
           </a:p>
         </p:txBody>
       </p:sp>
       <p:pic>
         <p:nvPicPr>
-          <p:cNvPr id="5" name="Picture 4">
-            <a:extLst>
-              <a:ext uri="{FF2B5EF4-FFF2-40B4-BE49-F238E27FC236}">
-                <a16:creationId xmlns:a16="http://schemas.microsoft.com/office/drawing/2014/main" id="{C19DCE35-8DB4-2481-1A7C-1C3B6388D829}"/>
+          <p:cNvPr id="3" name="Picture 2">
+            <a:extLst>
+              <a:ext uri="{FF2B5EF4-FFF2-40B4-BE49-F238E27FC236}">
+                <a16:creationId xmlns:a16="http://schemas.microsoft.com/office/drawing/2014/main" id="{72F80C2B-9B92-E5FA-0AB8-C0F764FC209B}"/>
               </a:ext>
             </a:extLst>
           </p:cNvPr>
@@ -3980,8 +4596,8 @@
         </p:blipFill>
         <p:spPr>
           <a:xfrm>
-            <a:off x="3808520" y="4580092"/>
-            <a:ext cx="2980047" cy="2417974"/>
+            <a:off x="3695213" y="1034170"/>
+            <a:ext cx="4801573" cy="6124456"/>
           </a:xfrm>
           <a:prstGeom prst="rect">
             <a:avLst/>
@@ -3991,7 +4607,7 @@
     </p:spTree>
     <p:extLst>
       <p:ext uri="{BB962C8B-B14F-4D97-AF65-F5344CB8AC3E}">
-        <p14:creationId xmlns:p14="http://schemas.microsoft.com/office/powerpoint/2010/main" val="3146126242"/>
+        <p14:creationId xmlns:p14="http://schemas.microsoft.com/office/powerpoint/2010/main" val="13975664"/>
       </p:ext>
     </p:extLst>
   </p:cSld>
@@ -4035,15 +4651,15 @@
           <p:cNvPr id="2" name="Title 1">
             <a:extLst>
               <a:ext uri="{FF2B5EF4-FFF2-40B4-BE49-F238E27FC236}">
-                <a16:creationId xmlns:a16="http://schemas.microsoft.com/office/drawing/2014/main" id="{2A227F88-9D0E-BE0B-889A-2A6314B9C61B}"/>
-              </a:ext>
-            </a:extLst>
-          </p:cNvPr>
-          <p:cNvSpPr>
-            <a:spLocks noGrp="1"/>
-          </p:cNvSpPr>
-          <p:nvPr>
-            <p:ph type="ctrTitle"/>
+                <a16:creationId xmlns:a16="http://schemas.microsoft.com/office/drawing/2014/main" id="{39F20681-E6BF-0195-2AFC-53A063D8D618}"/>
+              </a:ext>
+            </a:extLst>
+          </p:cNvPr>
+          <p:cNvSpPr>
+            <a:spLocks noGrp="1"/>
+          </p:cNvSpPr>
+          <p:nvPr>
+            <p:ph type="title"/>
           </p:nvPr>
         </p:nvSpPr>
         <p:spPr/>
@@ -4051,32 +4667,61 @@
           <a:bodyPr/>
           <a:lstStyle/>
           <a:p>
-            <a:r>
-              <a:rPr lang="en-CH" dirty="0">
-                <a:latin typeface="+mn-lt"/>
-              </a:rPr>
-              <a:t>OpenAI / ChatGPT</a:t>
-            </a:r>
-          </a:p>
-        </p:txBody>
-      </p:sp>
+            <a:pPr algn="ctr"/>
+            <a:r>
+              <a:rPr lang="en-CH" dirty="0"/>
+              <a:t>JavaScript</a:t>
+            </a:r>
+          </a:p>
+        </p:txBody>
+      </p:sp>
+      <p:pic>
+        <p:nvPicPr>
+          <p:cNvPr id="4" name="Picture 3">
+            <a:extLst>
+              <a:ext uri="{FF2B5EF4-FFF2-40B4-BE49-F238E27FC236}">
+                <a16:creationId xmlns:a16="http://schemas.microsoft.com/office/drawing/2014/main" id="{CBD1EDB5-8512-5954-8283-6EB51CE213FF}"/>
+              </a:ext>
+            </a:extLst>
+          </p:cNvPr>
+          <p:cNvPicPr>
+            <a:picLocks noChangeAspect="1"/>
+          </p:cNvPicPr>
+          <p:nvPr/>
+        </p:nvPicPr>
+        <p:blipFill>
+          <a:blip r:embed="rId2"/>
+          <a:stretch>
+            <a:fillRect/>
+          </a:stretch>
+        </p:blipFill>
+        <p:spPr>
+          <a:xfrm>
+            <a:off x="3695213" y="1027906"/>
+            <a:ext cx="4459231" cy="1813094"/>
+          </a:xfrm>
+          <a:prstGeom prst="rect">
+            <a:avLst/>
+          </a:prstGeom>
+        </p:spPr>
+      </p:pic>
     </p:spTree>
     <p:extLst>
       <p:ext uri="{BB962C8B-B14F-4D97-AF65-F5344CB8AC3E}">
-        <p14:creationId xmlns:p14="http://schemas.microsoft.com/office/powerpoint/2010/main" val="1170456708"/>
+        <p14:creationId xmlns:p14="http://schemas.microsoft.com/office/powerpoint/2010/main" val="647962461"/>
       </p:ext>
     </p:extLst>
   </p:cSld>
   <p:clrMapOvr>
     <a:masterClrMapping/>
   </p:clrMapOvr>
-  <mc:AlternateContent xmlns:mc="http://schemas.openxmlformats.org/markup-compatibility/2006">
-    <mc:Choice xmlns:p14="http://schemas.microsoft.com/office/powerpoint/2010/main" Requires="p14">
+  <mc:AlternateContent xmlns:mc="http://schemas.openxmlformats.org/markup-compatibility/2006" xmlns:p14="http://schemas.microsoft.com/office/powerpoint/2010/main">
+    <mc:Choice Requires="p14">
       <p:transition spd="med" p14:dur="700">
         <p:fade/>
       </p:transition>
     </mc:Choice>
-    <mc:Fallback>
+    <mc:Fallback xmlns="">
       <p:transition spd="med">
         <p:fade/>
       </p:transition>
@@ -4107,7 +4752,7 @@
           <p:cNvPr id="2" name="Title 1">
             <a:extLst>
               <a:ext uri="{FF2B5EF4-FFF2-40B4-BE49-F238E27FC236}">
-                <a16:creationId xmlns:a16="http://schemas.microsoft.com/office/drawing/2014/main" id="{654F7022-7E66-4FE2-DADF-5F23867E667E}"/>
+                <a16:creationId xmlns:a16="http://schemas.microsoft.com/office/drawing/2014/main" id="{39F20681-E6BF-0195-2AFC-53A063D8D618}"/>
               </a:ext>
             </a:extLst>
           </p:cNvPr>
@@ -4126,70 +4771,58 @@
             <a:pPr algn="ctr"/>
             <a:r>
               <a:rPr lang="en-CH" dirty="0"/>
-              <a:t>Was ist ChatGPT</a:t>
-            </a:r>
-          </a:p>
-        </p:txBody>
-      </p:sp>
-      <p:sp>
-        <p:nvSpPr>
-          <p:cNvPr id="4" name="Content Placeholder 2">
-            <a:extLst>
-              <a:ext uri="{FF2B5EF4-FFF2-40B4-BE49-F238E27FC236}">
-                <a16:creationId xmlns:a16="http://schemas.microsoft.com/office/drawing/2014/main" id="{573F10B5-0D28-8B48-8D98-2764751FC02E}"/>
-              </a:ext>
-            </a:extLst>
-          </p:cNvPr>
-          <p:cNvSpPr>
-            <a:spLocks noGrp="1"/>
-          </p:cNvSpPr>
-          <p:nvPr>
-            <p:ph idx="1"/>
-          </p:nvPr>
-        </p:nvSpPr>
+              <a:t>HTML</a:t>
+            </a:r>
+          </a:p>
+        </p:txBody>
+      </p:sp>
+      <p:pic>
+        <p:nvPicPr>
+          <p:cNvPr id="4" name="Picture 3">
+            <a:extLst>
+              <a:ext uri="{FF2B5EF4-FFF2-40B4-BE49-F238E27FC236}">
+                <a16:creationId xmlns:a16="http://schemas.microsoft.com/office/drawing/2014/main" id="{23AF9395-FD6C-3CAE-91C7-A652CA9E8D41}"/>
+              </a:ext>
+            </a:extLst>
+          </p:cNvPr>
+          <p:cNvPicPr>
+            <a:picLocks noChangeAspect="1"/>
+          </p:cNvPicPr>
+          <p:nvPr/>
+        </p:nvPicPr>
+        <p:blipFill>
+          <a:blip r:embed="rId2"/>
+          <a:stretch>
+            <a:fillRect/>
+          </a:stretch>
+        </p:blipFill>
         <p:spPr>
           <a:xfrm>
-            <a:off x="838200" y="1825625"/>
-            <a:ext cx="10515600" cy="4351338"/>
+            <a:off x="3695213" y="2600543"/>
+            <a:ext cx="4802084" cy="2009035"/>
           </a:xfrm>
+          <a:prstGeom prst="rect">
+            <a:avLst/>
+          </a:prstGeom>
         </p:spPr>
-        <p:txBody>
-          <a:bodyPr/>
-          <a:lstStyle/>
-          <a:p>
-            <a:r>
-              <a:rPr lang="en-CH" dirty="0"/>
-              <a:t>Chatbot</a:t>
-            </a:r>
-          </a:p>
-          <a:p>
-            <a:r>
-              <a:rPr lang="en-CH" dirty="0"/>
-              <a:t>Künstliche “Intelligenz”</a:t>
-            </a:r>
-          </a:p>
-          <a:p>
-            <a:endParaRPr lang="en-CH" dirty="0"/>
-          </a:p>
-        </p:txBody>
-      </p:sp>
+      </p:pic>
     </p:spTree>
     <p:extLst>
       <p:ext uri="{BB962C8B-B14F-4D97-AF65-F5344CB8AC3E}">
-        <p14:creationId xmlns:p14="http://schemas.microsoft.com/office/powerpoint/2010/main" val="682729952"/>
+        <p14:creationId xmlns:p14="http://schemas.microsoft.com/office/powerpoint/2010/main" val="3474283267"/>
       </p:ext>
     </p:extLst>
   </p:cSld>
   <p:clrMapOvr>
     <a:masterClrMapping/>
   </p:clrMapOvr>
-  <mc:AlternateContent xmlns:mc="http://schemas.openxmlformats.org/markup-compatibility/2006">
-    <mc:Choice xmlns:p14="http://schemas.microsoft.com/office/powerpoint/2010/main" Requires="p14">
+  <mc:AlternateContent xmlns:mc="http://schemas.openxmlformats.org/markup-compatibility/2006" xmlns:p14="http://schemas.microsoft.com/office/powerpoint/2010/main">
+    <mc:Choice Requires="p14">
       <p:transition spd="med" p14:dur="700">
         <p:fade/>
       </p:transition>
     </mc:Choice>
-    <mc:Fallback>
+    <mc:Fallback xmlns="">
       <p:transition spd="med">
         <p:fade/>
       </p:transition>
@@ -4220,7 +4853,7 @@
           <p:cNvPr id="2" name="Title 1">
             <a:extLst>
               <a:ext uri="{FF2B5EF4-FFF2-40B4-BE49-F238E27FC236}">
-                <a16:creationId xmlns:a16="http://schemas.microsoft.com/office/drawing/2014/main" id="{37F4DEC1-7743-65B5-7AF4-6D99342A3370}"/>
+                <a16:creationId xmlns:a16="http://schemas.microsoft.com/office/drawing/2014/main" id="{39F20681-E6BF-0195-2AFC-53A063D8D618}"/>
               </a:ext>
             </a:extLst>
           </p:cNvPr>
@@ -4239,74 +4872,58 @@
             <a:pPr algn="ctr"/>
             <a:r>
               <a:rPr lang="en-CH" dirty="0"/>
-              <a:t>AIs von OpenAI</a:t>
-            </a:r>
-          </a:p>
-        </p:txBody>
-      </p:sp>
-      <p:sp>
-        <p:nvSpPr>
-          <p:cNvPr id="3" name="Content Placeholder 2">
-            <a:extLst>
-              <a:ext uri="{FF2B5EF4-FFF2-40B4-BE49-F238E27FC236}">
-                <a16:creationId xmlns:a16="http://schemas.microsoft.com/office/drawing/2014/main" id="{8DD2D7CD-ED6A-F198-CDCF-FE3383811B0B}"/>
-              </a:ext>
-            </a:extLst>
-          </p:cNvPr>
-          <p:cNvSpPr>
-            <a:spLocks noGrp="1"/>
-          </p:cNvSpPr>
-          <p:nvPr>
-            <p:ph idx="1"/>
-          </p:nvPr>
-        </p:nvSpPr>
-        <p:spPr/>
-        <p:txBody>
-          <a:bodyPr/>
-          <a:lstStyle/>
-          <a:p>
-            <a:r>
-              <a:rPr lang="en-CH" b="1" dirty="0"/>
-              <a:t>GPT-4 (Text Generierung)</a:t>
-            </a:r>
-          </a:p>
-          <a:p>
-            <a:r>
-              <a:rPr lang="en-CH" b="1" dirty="0"/>
-              <a:t>Dall-E-2 (Bilder Generierung)</a:t>
-            </a:r>
-          </a:p>
-          <a:p>
-            <a:r>
-              <a:rPr lang="en-CH" dirty="0"/>
-              <a:t>TTS (Text-To-Speech)</a:t>
-            </a:r>
-          </a:p>
-          <a:p>
-            <a:r>
-              <a:rPr lang="en-CH" dirty="0"/>
-              <a:t>Whisper (Speech-To-Text)</a:t>
-            </a:r>
-          </a:p>
-        </p:txBody>
-      </p:sp>
+              <a:t>CSS</a:t>
+            </a:r>
+          </a:p>
+        </p:txBody>
+      </p:sp>
+      <p:pic>
+        <p:nvPicPr>
+          <p:cNvPr id="4" name="Picture 3">
+            <a:extLst>
+              <a:ext uri="{FF2B5EF4-FFF2-40B4-BE49-F238E27FC236}">
+                <a16:creationId xmlns:a16="http://schemas.microsoft.com/office/drawing/2014/main" id="{113AD6AA-CBA7-E3AF-7844-D59FAFFD8186}"/>
+              </a:ext>
+            </a:extLst>
+          </p:cNvPr>
+          <p:cNvPicPr>
+            <a:picLocks noChangeAspect="1"/>
+          </p:cNvPicPr>
+          <p:nvPr/>
+        </p:nvPicPr>
+        <p:blipFill>
+          <a:blip r:embed="rId3"/>
+          <a:stretch>
+            <a:fillRect/>
+          </a:stretch>
+        </p:blipFill>
+        <p:spPr>
+          <a:xfrm>
+            <a:off x="3695213" y="4371583"/>
+            <a:ext cx="3153760" cy="2787043"/>
+          </a:xfrm>
+          <a:prstGeom prst="rect">
+            <a:avLst/>
+          </a:prstGeom>
+        </p:spPr>
+      </p:pic>
     </p:spTree>
     <p:extLst>
       <p:ext uri="{BB962C8B-B14F-4D97-AF65-F5344CB8AC3E}">
-        <p14:creationId xmlns:p14="http://schemas.microsoft.com/office/powerpoint/2010/main" val="1010253080"/>
+        <p14:creationId xmlns:p14="http://schemas.microsoft.com/office/powerpoint/2010/main" val="346490068"/>
       </p:ext>
     </p:extLst>
   </p:cSld>
   <p:clrMapOvr>
     <a:masterClrMapping/>
   </p:clrMapOvr>
-  <mc:AlternateContent xmlns:mc="http://schemas.openxmlformats.org/markup-compatibility/2006">
-    <mc:Choice xmlns:p14="http://schemas.microsoft.com/office/powerpoint/2010/main" Requires="p14">
+  <mc:AlternateContent xmlns:mc="http://schemas.openxmlformats.org/markup-compatibility/2006" xmlns:p14="http://schemas.microsoft.com/office/powerpoint/2010/main">
+    <mc:Choice Requires="p14">
       <p:transition spd="med" p14:dur="700">
         <p:fade/>
       </p:transition>
     </mc:Choice>
-    <mc:Fallback>
+    <mc:Fallback xmlns="">
       <p:transition spd="med">
         <p:fade/>
       </p:transition>
@@ -4574,4 +5191,299 @@
     </a:ext>
   </a:extLst>
 </a:theme>
+</file>
+
+<file path=ppt/theme/theme2.xml><?xml version="1.0" encoding="utf-8"?>
+<a:theme xmlns:a="http://schemas.openxmlformats.org/drawingml/2006/main" name="Office Theme">
+  <a:themeElements>
+    <a:clrScheme name="Office">
+      <a:dk1>
+        <a:sysClr val="windowText" lastClr="000000"/>
+      </a:dk1>
+      <a:lt1>
+        <a:sysClr val="window" lastClr="FFFFFF"/>
+      </a:lt1>
+      <a:dk2>
+        <a:srgbClr val="44546A"/>
+      </a:dk2>
+      <a:lt2>
+        <a:srgbClr val="E7E6E6"/>
+      </a:lt2>
+      <a:accent1>
+        <a:srgbClr val="4472C4"/>
+      </a:accent1>
+      <a:accent2>
+        <a:srgbClr val="ED7D31"/>
+      </a:accent2>
+      <a:accent3>
+        <a:srgbClr val="A5A5A5"/>
+      </a:accent3>
+      <a:accent4>
+        <a:srgbClr val="FFC000"/>
+      </a:accent4>
+      <a:accent5>
+        <a:srgbClr val="5B9BD5"/>
+      </a:accent5>
+      <a:accent6>
+        <a:srgbClr val="70AD47"/>
+      </a:accent6>
+      <a:hlink>
+        <a:srgbClr val="0563C1"/>
+      </a:hlink>
+      <a:folHlink>
+        <a:srgbClr val="954F72"/>
+      </a:folHlink>
+    </a:clrScheme>
+    <a:fontScheme name="Office">
+      <a:majorFont>
+        <a:latin typeface="Calibri Light" panose="020F0302020204030204"/>
+        <a:ea typeface=""/>
+        <a:cs typeface=""/>
+        <a:font script="Jpan" typeface="游ゴシック Light"/>
+        <a:font script="Hang" typeface="맑은 고딕"/>
+        <a:font script="Hans" typeface="等线 Light"/>
+        <a:font script="Hant" typeface="新細明體"/>
+        <a:font script="Arab" typeface="Times New Roman"/>
+        <a:font script="Hebr" typeface="Times New Roman"/>
+        <a:font script="Thai" typeface="Angsana New"/>
+        <a:font script="Ethi" typeface="Nyala"/>
+        <a:font script="Beng" typeface="Vrinda"/>
+        <a:font script="Gujr" typeface="Shruti"/>
+        <a:font script="Khmr" typeface="MoolBoran"/>
+        <a:font script="Knda" typeface="Tunga"/>
+        <a:font script="Guru" typeface="Raavi"/>
+        <a:font script="Cans" typeface="Euphemia"/>
+        <a:font script="Cher" typeface="Plantagenet Cherokee"/>
+        <a:font script="Yiii" typeface="Microsoft Yi Baiti"/>
+        <a:font script="Tibt" typeface="Microsoft Himalaya"/>
+        <a:font script="Thaa" typeface="MV Boli"/>
+        <a:font script="Deva" typeface="Mangal"/>
+        <a:font script="Telu" typeface="Gautami"/>
+        <a:font script="Taml" typeface="Latha"/>
+        <a:font script="Syrc" typeface="Estrangelo Edessa"/>
+        <a:font script="Orya" typeface="Kalinga"/>
+        <a:font script="Mlym" typeface="Kartika"/>
+        <a:font script="Laoo" typeface="DokChampa"/>
+        <a:font script="Sinh" typeface="Iskoola Pota"/>
+        <a:font script="Mong" typeface="Mongolian Baiti"/>
+        <a:font script="Viet" typeface="Times New Roman"/>
+        <a:font script="Uigh" typeface="Microsoft Uighur"/>
+        <a:font script="Geor" typeface="Sylfaen"/>
+        <a:font script="Armn" typeface="Arial"/>
+        <a:font script="Bugi" typeface="Leelawadee UI"/>
+        <a:font script="Bopo" typeface="Microsoft JhengHei"/>
+        <a:font script="Java" typeface="Javanese Text"/>
+        <a:font script="Lisu" typeface="Segoe UI"/>
+        <a:font script="Mymr" typeface="Myanmar Text"/>
+        <a:font script="Nkoo" typeface="Ebrima"/>
+        <a:font script="Olck" typeface="Nirmala UI"/>
+        <a:font script="Osma" typeface="Ebrima"/>
+        <a:font script="Phag" typeface="Phagspa"/>
+        <a:font script="Syrn" typeface="Estrangelo Edessa"/>
+        <a:font script="Syrj" typeface="Estrangelo Edessa"/>
+        <a:font script="Syre" typeface="Estrangelo Edessa"/>
+        <a:font script="Sora" typeface="Nirmala UI"/>
+        <a:font script="Tale" typeface="Microsoft Tai Le"/>
+        <a:font script="Talu" typeface="Microsoft New Tai Lue"/>
+        <a:font script="Tfng" typeface="Ebrima"/>
+      </a:majorFont>
+      <a:minorFont>
+        <a:latin typeface="Calibri" panose="020F0502020204030204"/>
+        <a:ea typeface=""/>
+        <a:cs typeface=""/>
+        <a:font script="Jpan" typeface="游ゴシック"/>
+        <a:font script="Hang" typeface="맑은 고딕"/>
+        <a:font script="Hans" typeface="等线"/>
+        <a:font script="Hant" typeface="新細明體"/>
+        <a:font script="Arab" typeface="Arial"/>
+        <a:font script="Hebr" typeface="Arial"/>
+        <a:font script="Thai" typeface="Cordia New"/>
+        <a:font script="Ethi" typeface="Nyala"/>
+        <a:font script="Beng" typeface="Vrinda"/>
+        <a:font script="Gujr" typeface="Shruti"/>
+        <a:font script="Khmr" typeface="DaunPenh"/>
+        <a:font script="Knda" typeface="Tunga"/>
+        <a:font script="Guru" typeface="Raavi"/>
+        <a:font script="Cans" typeface="Euphemia"/>
+        <a:font script="Cher" typeface="Plantagenet Cherokee"/>
+        <a:font script="Yiii" typeface="Microsoft Yi Baiti"/>
+        <a:font script="Tibt" typeface="Microsoft Himalaya"/>
+        <a:font script="Thaa" typeface="MV Boli"/>
+        <a:font script="Deva" typeface="Mangal"/>
+        <a:font script="Telu" typeface="Gautami"/>
+        <a:font script="Taml" typeface="Latha"/>
+        <a:font script="Syrc" typeface="Estrangelo Edessa"/>
+        <a:font script="Orya" typeface="Kalinga"/>
+        <a:font script="Mlym" typeface="Kartika"/>
+        <a:font script="Laoo" typeface="DokChampa"/>
+        <a:font script="Sinh" typeface="Iskoola Pota"/>
+        <a:font script="Mong" typeface="Mongolian Baiti"/>
+        <a:font script="Viet" typeface="Arial"/>
+        <a:font script="Uigh" typeface="Microsoft Uighur"/>
+        <a:font script="Geor" typeface="Sylfaen"/>
+        <a:font script="Armn" typeface="Arial"/>
+        <a:font script="Bugi" typeface="Leelawadee UI"/>
+        <a:font script="Bopo" typeface="Microsoft JhengHei"/>
+        <a:font script="Java" typeface="Javanese Text"/>
+        <a:font script="Lisu" typeface="Segoe UI"/>
+        <a:font script="Mymr" typeface="Myanmar Text"/>
+        <a:font script="Nkoo" typeface="Ebrima"/>
+        <a:font script="Olck" typeface="Nirmala UI"/>
+        <a:font script="Osma" typeface="Ebrima"/>
+        <a:font script="Phag" typeface="Phagspa"/>
+        <a:font script="Syrn" typeface="Estrangelo Edessa"/>
+        <a:font script="Syrj" typeface="Estrangelo Edessa"/>
+        <a:font script="Syre" typeface="Estrangelo Edessa"/>
+        <a:font script="Sora" typeface="Nirmala UI"/>
+        <a:font script="Tale" typeface="Microsoft Tai Le"/>
+        <a:font script="Talu" typeface="Microsoft New Tai Lue"/>
+        <a:font script="Tfng" typeface="Ebrima"/>
+      </a:minorFont>
+    </a:fontScheme>
+    <a:fmtScheme name="Office">
+      <a:fillStyleLst>
+        <a:solidFill>
+          <a:schemeClr val="phClr"/>
+        </a:solidFill>
+        <a:gradFill rotWithShape="1">
+          <a:gsLst>
+            <a:gs pos="0">
+              <a:schemeClr val="phClr">
+                <a:lumMod val="110000"/>
+                <a:satMod val="105000"/>
+                <a:tint val="67000"/>
+              </a:schemeClr>
+            </a:gs>
+            <a:gs pos="50000">
+              <a:schemeClr val="phClr">
+                <a:lumMod val="105000"/>
+                <a:satMod val="103000"/>
+                <a:tint val="73000"/>
+              </a:schemeClr>
+            </a:gs>
+            <a:gs pos="100000">
+              <a:schemeClr val="phClr">
+                <a:lumMod val="105000"/>
+                <a:satMod val="109000"/>
+                <a:tint val="81000"/>
+              </a:schemeClr>
+            </a:gs>
+          </a:gsLst>
+          <a:lin ang="5400000" scaled="0"/>
+        </a:gradFill>
+        <a:gradFill rotWithShape="1">
+          <a:gsLst>
+            <a:gs pos="0">
+              <a:schemeClr val="phClr">
+                <a:satMod val="103000"/>
+                <a:lumMod val="102000"/>
+                <a:tint val="94000"/>
+              </a:schemeClr>
+            </a:gs>
+            <a:gs pos="50000">
+              <a:schemeClr val="phClr">
+                <a:satMod val="110000"/>
+                <a:lumMod val="100000"/>
+                <a:shade val="100000"/>
+              </a:schemeClr>
+            </a:gs>
+            <a:gs pos="100000">
+              <a:schemeClr val="phClr">
+                <a:lumMod val="99000"/>
+                <a:satMod val="120000"/>
+                <a:shade val="78000"/>
+              </a:schemeClr>
+            </a:gs>
+          </a:gsLst>
+          <a:lin ang="5400000" scaled="0"/>
+        </a:gradFill>
+      </a:fillStyleLst>
+      <a:lnStyleLst>
+        <a:ln w="6350" cap="flat" cmpd="sng" algn="ctr">
+          <a:solidFill>
+            <a:schemeClr val="phClr"/>
+          </a:solidFill>
+          <a:prstDash val="solid"/>
+          <a:miter lim="800000"/>
+        </a:ln>
+        <a:ln w="12700" cap="flat" cmpd="sng" algn="ctr">
+          <a:solidFill>
+            <a:schemeClr val="phClr"/>
+          </a:solidFill>
+          <a:prstDash val="solid"/>
+          <a:miter lim="800000"/>
+        </a:ln>
+        <a:ln w="19050" cap="flat" cmpd="sng" algn="ctr">
+          <a:solidFill>
+            <a:schemeClr val="phClr"/>
+          </a:solidFill>
+          <a:prstDash val="solid"/>
+          <a:miter lim="800000"/>
+        </a:ln>
+      </a:lnStyleLst>
+      <a:effectStyleLst>
+        <a:effectStyle>
+          <a:effectLst/>
+        </a:effectStyle>
+        <a:effectStyle>
+          <a:effectLst/>
+        </a:effectStyle>
+        <a:effectStyle>
+          <a:effectLst>
+            <a:outerShdw blurRad="57150" dist="19050" dir="5400000" algn="ctr" rotWithShape="0">
+              <a:srgbClr val="000000">
+                <a:alpha val="63000"/>
+              </a:srgbClr>
+            </a:outerShdw>
+          </a:effectLst>
+        </a:effectStyle>
+      </a:effectStyleLst>
+      <a:bgFillStyleLst>
+        <a:solidFill>
+          <a:schemeClr val="phClr"/>
+        </a:solidFill>
+        <a:solidFill>
+          <a:schemeClr val="phClr">
+            <a:tint val="95000"/>
+            <a:satMod val="170000"/>
+          </a:schemeClr>
+        </a:solidFill>
+        <a:gradFill rotWithShape="1">
+          <a:gsLst>
+            <a:gs pos="0">
+              <a:schemeClr val="phClr">
+                <a:tint val="93000"/>
+                <a:satMod val="150000"/>
+                <a:shade val="98000"/>
+                <a:lumMod val="102000"/>
+              </a:schemeClr>
+            </a:gs>
+            <a:gs pos="50000">
+              <a:schemeClr val="phClr">
+                <a:tint val="98000"/>
+                <a:satMod val="130000"/>
+                <a:shade val="90000"/>
+                <a:lumMod val="103000"/>
+              </a:schemeClr>
+            </a:gs>
+            <a:gs pos="100000">
+              <a:schemeClr val="phClr">
+                <a:shade val="63000"/>
+                <a:satMod val="120000"/>
+              </a:schemeClr>
+            </a:gs>
+          </a:gsLst>
+          <a:lin ang="5400000" scaled="0"/>
+        </a:gradFill>
+      </a:bgFillStyleLst>
+    </a:fmtScheme>
+  </a:themeElements>
+  <a:objectDefaults/>
+  <a:extraClrSchemeLst/>
+  <a:extLst>
+    <a:ext uri="{05A4C25C-085E-4340-85A3-A5531E510DB2}">
+      <thm15:themeFamily xmlns:thm15="http://schemas.microsoft.com/office/thememl/2012/main" name="Office Theme" id="{62F939B6-93AF-4DB8-9C6B-D6C7DFDC589F}" vid="{4A3C46E8-61CC-4603-A589-7422A47A8E4A}"/>
+    </a:ext>
+  </a:extLst>
+</a:theme>
 </file>
</xml_diff>